<commit_message>
2_11 Update - Pytorch - Tensor
</commit_message>
<xml_diff>
--- a/WeeklyContent/Week1_02_09/计划初稿-周末提交版.pptx
+++ b/WeeklyContent/Week1_02_09/计划初稿-周末提交版.pptx
@@ -5,7 +5,7 @@
     <p:sldMasterId id="2147483720" r:id="rId1"/>
   </p:sldMasterIdLst>
   <p:notesMasterIdLst>
-    <p:notesMasterId r:id="rId15"/>
+    <p:notesMasterId r:id="rId16"/>
   </p:notesMasterIdLst>
   <p:sldIdLst>
     <p:sldId id="256" r:id="rId2"/>
@@ -20,7 +20,8 @@
     <p:sldId id="272" r:id="rId11"/>
     <p:sldId id="273" r:id="rId12"/>
     <p:sldId id="274" r:id="rId13"/>
-    <p:sldId id="268" r:id="rId14"/>
+    <p:sldId id="275" r:id="rId14"/>
+    <p:sldId id="268" r:id="rId15"/>
   </p:sldIdLst>
   <p:sldSz cx="12192000" cy="6858000"/>
   <p:notesSz cx="6858000" cy="9144000"/>
@@ -9590,14 +9591,14 @@
         <a:lstStyle/>
         <a:p>
           <a:r>
-            <a:rPr lang="en-US"/>
+            <a:rPr lang="en-US" dirty="0"/>
             <a:t>问题</a:t>
           </a:r>
           <a:r>
-            <a:rPr lang="zh-CN"/>
+            <a:rPr lang="zh-CN" dirty="0"/>
             <a:t>：背后的原理尚不清楚，需要研究傅立叶变换</a:t>
           </a:r>
-          <a:endParaRPr lang="en-US"/>
+          <a:endParaRPr lang="en-US" dirty="0"/>
         </a:p>
       </dgm:t>
     </dgm:pt>
@@ -13168,14 +13169,14 @@
             <a:buNone/>
           </a:pPr>
           <a:r>
-            <a:rPr lang="en-US" sz="2900" kern="1200"/>
+            <a:rPr lang="en-US" sz="2900" kern="1200" dirty="0"/>
             <a:t>问题</a:t>
           </a:r>
           <a:r>
-            <a:rPr lang="zh-CN" sz="2900" kern="1200"/>
+            <a:rPr lang="zh-CN" sz="2900" kern="1200" dirty="0"/>
             <a:t>：背后的原理尚不清楚，需要研究傅立叶变换</a:t>
           </a:r>
-          <a:endParaRPr lang="en-US" sz="2900" kern="1200"/>
+          <a:endParaRPr lang="en-US" sz="2900" kern="1200" dirty="0"/>
         </a:p>
       </dsp:txBody>
       <dsp:txXfrm>
@@ -30715,6 +30716,15 @@
 <file path=ppt/slides/slide12.xml><?xml version="1.0" encoding="utf-8"?>
 <p:sld xmlns:a="http://schemas.openxmlformats.org/drawingml/2006/main" xmlns:r="http://schemas.openxmlformats.org/officeDocument/2006/relationships" xmlns:p="http://schemas.openxmlformats.org/presentationml/2006/main">
   <p:cSld>
+    <p:bg>
+      <p:bgPr>
+        <a:blipFill rotWithShape="1">
+          <a:blip r:embed="rId2"/>
+          <a:stretch/>
+        </a:blipFill>
+        <a:effectLst/>
+      </p:bgPr>
+    </p:bg>
     <p:spTree>
       <p:nvGrpSpPr>
         <p:cNvPr id="1" name=""/>
@@ -30729,6 +30739,348 @@
           <a:chExt cx="0" cy="0"/>
         </a:xfrm>
       </p:grpSpPr>
+      <p:sp useBgFill="1">
+        <p:nvSpPr>
+          <p:cNvPr id="67" name="Rectangle 52">
+            <a:extLst>
+              <a:ext uri="{FF2B5EF4-FFF2-40B4-BE49-F238E27FC236}">
+                <a16:creationId xmlns:a16="http://schemas.microsoft.com/office/drawing/2014/main" id="{9B0F3308-12C4-4DD7-ABB4-D0DFAA3CF6DE}"/>
+              </a:ext>
+              <a:ext uri="{C183D7F6-B498-43B3-948B-1728B52AA6E4}">
+                <adec:decorative xmlns:adec="http://schemas.microsoft.com/office/drawing/2017/decorative" val="1"/>
+              </a:ext>
+            </a:extLst>
+          </p:cNvPr>
+          <p:cNvSpPr>
+            <a:spLocks noGrp="1" noRot="1" noChangeAspect="1" noMove="1" noResize="1" noEditPoints="1" noAdjustHandles="1" noChangeArrowheads="1" noChangeShapeType="1" noTextEdit="1"/>
+          </p:cNvSpPr>
+          <p:nvPr>
+            <p:extLst>
+              <p:ext uri="{386F3935-93C4-4BCD-93E2-E3B085C9AB24}">
+                <p16:designElem xmlns:p16="http://schemas.microsoft.com/office/powerpoint/2015/main" val="1"/>
+              </p:ext>
+            </p:extLst>
+          </p:nvPr>
+        </p:nvSpPr>
+        <p:spPr>
+          <a:xfrm>
+            <a:off x="0" y="0"/>
+            <a:ext cx="12189867" cy="6855282"/>
+          </a:xfrm>
+          <a:prstGeom prst="rect">
+            <a:avLst/>
+          </a:prstGeom>
+          <a:ln>
+            <a:noFill/>
+          </a:ln>
+        </p:spPr>
+        <p:style>
+          <a:lnRef idx="2">
+            <a:schemeClr val="accent1">
+              <a:shade val="50000"/>
+            </a:schemeClr>
+          </a:lnRef>
+          <a:fillRef idx="1">
+            <a:schemeClr val="accent1"/>
+          </a:fillRef>
+          <a:effectRef idx="0">
+            <a:schemeClr val="accent1"/>
+          </a:effectRef>
+          <a:fontRef idx="minor">
+            <a:schemeClr val="lt1"/>
+          </a:fontRef>
+        </p:style>
+        <p:txBody>
+          <a:bodyPr rtlCol="0" anchor="ctr"/>
+          <a:lstStyle/>
+          <a:p>
+            <a:pPr algn="ctr"/>
+            <a:endParaRPr lang="en-US"/>
+          </a:p>
+        </p:txBody>
+      </p:sp>
+      <p:pic>
+        <p:nvPicPr>
+          <p:cNvPr id="68" name="Picture 54">
+            <a:extLst>
+              <a:ext uri="{FF2B5EF4-FFF2-40B4-BE49-F238E27FC236}">
+                <a16:creationId xmlns:a16="http://schemas.microsoft.com/office/drawing/2014/main" id="{6A24046D-AAB6-4470-AC22-6448D576E5B5}"/>
+              </a:ext>
+              <a:ext uri="{C183D7F6-B498-43B3-948B-1728B52AA6E4}">
+                <adec:decorative xmlns:adec="http://schemas.microsoft.com/office/drawing/2017/decorative" val="1"/>
+              </a:ext>
+            </a:extLst>
+          </p:cNvPr>
+          <p:cNvPicPr>
+            <a:picLocks noGrp="1" noRot="1" noChangeAspect="1" noMove="1" noResize="1" noEditPoints="1" noAdjustHandles="1" noChangeArrowheads="1" noChangeShapeType="1" noCrop="1"/>
+          </p:cNvPicPr>
+          <p:nvPr>
+            <p:extLst>
+              <p:ext uri="{386F3935-93C4-4BCD-93E2-E3B085C9AB24}">
+                <p16:designElem xmlns:p16="http://schemas.microsoft.com/office/powerpoint/2015/main" val="1"/>
+              </p:ext>
+            </p:extLst>
+          </p:nvPr>
+        </p:nvPicPr>
+        <p:blipFill>
+          <a:blip r:embed="rId3">
+            <a:extLst>
+              <a:ext uri="{28A0092B-C50C-407E-A947-70E740481C1C}">
+                <a14:useLocalDpi xmlns:a14="http://schemas.microsoft.com/office/drawing/2010/main" val="0"/>
+              </a:ext>
+            </a:extLst>
+          </a:blip>
+          <a:stretch>
+            <a:fillRect/>
+          </a:stretch>
+        </p:blipFill>
+        <p:spPr>
+          <a:xfrm>
+            <a:off x="2831794" y="2105202"/>
+            <a:ext cx="9360205" cy="4752798"/>
+          </a:xfrm>
+          <a:prstGeom prst="rect">
+            <a:avLst/>
+          </a:prstGeom>
+        </p:spPr>
+      </p:pic>
+      <p:pic>
+        <p:nvPicPr>
+          <p:cNvPr id="69" name="Picture 56">
+            <a:extLst>
+              <a:ext uri="{FF2B5EF4-FFF2-40B4-BE49-F238E27FC236}">
+                <a16:creationId xmlns:a16="http://schemas.microsoft.com/office/drawing/2014/main" id="{211A0A85-392D-49DA-B9EC-82262B3B9614}"/>
+              </a:ext>
+              <a:ext uri="{C183D7F6-B498-43B3-948B-1728B52AA6E4}">
+                <adec:decorative xmlns:adec="http://schemas.microsoft.com/office/drawing/2017/decorative" val="1"/>
+              </a:ext>
+            </a:extLst>
+          </p:cNvPr>
+          <p:cNvPicPr>
+            <a:picLocks noGrp="1" noRot="1" noChangeAspect="1" noMove="1" noResize="1" noEditPoints="1" noAdjustHandles="1" noChangeArrowheads="1" noChangeShapeType="1" noCrop="1"/>
+          </p:cNvPicPr>
+          <p:nvPr>
+            <p:extLst>
+              <p:ext uri="{386F3935-93C4-4BCD-93E2-E3B085C9AB24}">
+                <p16:designElem xmlns:p16="http://schemas.microsoft.com/office/powerpoint/2015/main" val="1"/>
+              </p:ext>
+            </p:extLst>
+          </p:nvPr>
+        </p:nvPicPr>
+        <p:blipFill>
+          <a:blip r:embed="rId4">
+            <a:alphaModFix/>
+            <a:extLst>
+              <a:ext uri="{28A0092B-C50C-407E-A947-70E740481C1C}">
+                <a14:useLocalDpi xmlns:a14="http://schemas.microsoft.com/office/drawing/2010/main" val="0"/>
+              </a:ext>
+            </a:extLst>
+          </a:blip>
+          <a:stretch>
+            <a:fillRect/>
+          </a:stretch>
+        </p:blipFill>
+        <p:spPr>
+          <a:xfrm>
+            <a:off x="0" y="0"/>
+            <a:ext cx="12189867" cy="6858000"/>
+          </a:xfrm>
+          <a:prstGeom prst="rect">
+            <a:avLst/>
+          </a:prstGeom>
+        </p:spPr>
+      </p:pic>
+      <p:sp>
+        <p:nvSpPr>
+          <p:cNvPr id="70" name="Rectangle 58">
+            <a:extLst>
+              <a:ext uri="{FF2B5EF4-FFF2-40B4-BE49-F238E27FC236}">
+                <a16:creationId xmlns:a16="http://schemas.microsoft.com/office/drawing/2014/main" id="{73AFD74C-283C-45BD-885B-6E6635E4B3F1}"/>
+              </a:ext>
+              <a:ext uri="{C183D7F6-B498-43B3-948B-1728B52AA6E4}">
+                <adec:decorative xmlns:adec="http://schemas.microsoft.com/office/drawing/2017/decorative" val="1"/>
+              </a:ext>
+            </a:extLst>
+          </p:cNvPr>
+          <p:cNvSpPr>
+            <a:spLocks noGrp="1" noRot="1" noChangeAspect="1" noMove="1" noResize="1" noEditPoints="1" noAdjustHandles="1" noChangeArrowheads="1" noChangeShapeType="1" noTextEdit="1"/>
+          </p:cNvSpPr>
+          <p:nvPr>
+            <p:extLst>
+              <p:ext uri="{386F3935-93C4-4BCD-93E2-E3B085C9AB24}">
+                <p16:designElem xmlns:p16="http://schemas.microsoft.com/office/powerpoint/2015/main" val="1"/>
+              </p:ext>
+            </p:extLst>
+          </p:nvPr>
+        </p:nvSpPr>
+        <p:spPr>
+          <a:xfrm>
+            <a:off x="0" y="0"/>
+            <a:ext cx="964174" cy="6858000"/>
+          </a:xfrm>
+          <a:prstGeom prst="rect">
+            <a:avLst/>
+          </a:prstGeom>
+          <a:solidFill>
+            <a:schemeClr val="bg2"/>
+          </a:solidFill>
+          <a:ln>
+            <a:noFill/>
+          </a:ln>
+        </p:spPr>
+        <p:style>
+          <a:lnRef idx="2">
+            <a:schemeClr val="accent1">
+              <a:shade val="50000"/>
+            </a:schemeClr>
+          </a:lnRef>
+          <a:fillRef idx="1">
+            <a:schemeClr val="accent1"/>
+          </a:fillRef>
+          <a:effectRef idx="0">
+            <a:schemeClr val="accent1"/>
+          </a:effectRef>
+          <a:fontRef idx="minor">
+            <a:schemeClr val="lt1"/>
+          </a:fontRef>
+        </p:style>
+        <p:txBody>
+          <a:bodyPr rtlCol="0" anchor="ctr"/>
+          <a:lstStyle/>
+          <a:p>
+            <a:pPr algn="ctr"/>
+            <a:endParaRPr lang="en-US"/>
+          </a:p>
+        </p:txBody>
+      </p:sp>
+      <p:sp>
+        <p:nvSpPr>
+          <p:cNvPr id="71" name="Rectangle 60">
+            <a:extLst>
+              <a:ext uri="{FF2B5EF4-FFF2-40B4-BE49-F238E27FC236}">
+                <a16:creationId xmlns:a16="http://schemas.microsoft.com/office/drawing/2014/main" id="{CE3DE725-FEB0-422F-BDBA-A29C95768A3F}"/>
+              </a:ext>
+              <a:ext uri="{C183D7F6-B498-43B3-948B-1728B52AA6E4}">
+                <adec:decorative xmlns:adec="http://schemas.microsoft.com/office/drawing/2017/decorative" val="1"/>
+              </a:ext>
+            </a:extLst>
+          </p:cNvPr>
+          <p:cNvSpPr>
+            <a:spLocks noGrp="1" noRot="1" noChangeAspect="1" noMove="1" noResize="1" noEditPoints="1" noAdjustHandles="1" noChangeArrowheads="1" noChangeShapeType="1" noTextEdit="1"/>
+          </p:cNvSpPr>
+          <p:nvPr>
+            <p:extLst>
+              <p:ext uri="{386F3935-93C4-4BCD-93E2-E3B085C9AB24}">
+                <p16:designElem xmlns:p16="http://schemas.microsoft.com/office/powerpoint/2015/main" val="1"/>
+              </p:ext>
+            </p:extLst>
+          </p:nvPr>
+        </p:nvSpPr>
+        <p:spPr>
+          <a:xfrm>
+            <a:off x="962042" y="0"/>
+            <a:ext cx="45719" cy="6858000"/>
+          </a:xfrm>
+          <a:prstGeom prst="rect">
+            <a:avLst/>
+          </a:prstGeom>
+          <a:solidFill>
+            <a:schemeClr val="accent6"/>
+          </a:solidFill>
+          <a:ln>
+            <a:noFill/>
+          </a:ln>
+        </p:spPr>
+        <p:style>
+          <a:lnRef idx="2">
+            <a:schemeClr val="accent1">
+              <a:shade val="50000"/>
+            </a:schemeClr>
+          </a:lnRef>
+          <a:fillRef idx="1">
+            <a:schemeClr val="accent1"/>
+          </a:fillRef>
+          <a:effectRef idx="0">
+            <a:schemeClr val="accent1"/>
+          </a:effectRef>
+          <a:fontRef idx="minor">
+            <a:schemeClr val="lt1"/>
+          </a:fontRef>
+        </p:style>
+        <p:txBody>
+          <a:bodyPr rtlCol="0" anchor="ctr"/>
+          <a:lstStyle/>
+          <a:p>
+            <a:pPr algn="ctr"/>
+            <a:endParaRPr lang="en-US"/>
+          </a:p>
+        </p:txBody>
+      </p:sp>
+      <p:sp>
+        <p:nvSpPr>
+          <p:cNvPr id="72" name="Rectangle 62">
+            <a:extLst>
+              <a:ext uri="{FF2B5EF4-FFF2-40B4-BE49-F238E27FC236}">
+                <a16:creationId xmlns:a16="http://schemas.microsoft.com/office/drawing/2014/main" id="{05058156-257B-4118-BA50-5869C8AF6AD7}"/>
+              </a:ext>
+              <a:ext uri="{C183D7F6-B498-43B3-948B-1728B52AA6E4}">
+                <adec:decorative xmlns:adec="http://schemas.microsoft.com/office/drawing/2017/decorative" val="1"/>
+              </a:ext>
+            </a:extLst>
+          </p:cNvPr>
+          <p:cNvSpPr>
+            <a:spLocks noGrp="1" noRot="1" noChangeAspect="1" noMove="1" noResize="1" noEditPoints="1" noAdjustHandles="1" noChangeArrowheads="1" noChangeShapeType="1" noTextEdit="1"/>
+          </p:cNvSpPr>
+          <p:nvPr>
+            <p:extLst>
+              <p:ext uri="{386F3935-93C4-4BCD-93E2-E3B085C9AB24}">
+                <p16:designElem xmlns:p16="http://schemas.microsoft.com/office/powerpoint/2015/main" val="1"/>
+              </p:ext>
+            </p:extLst>
+          </p:nvPr>
+        </p:nvSpPr>
+        <p:spPr>
+          <a:xfrm>
+            <a:off x="1007533" y="0"/>
+            <a:ext cx="10378001" cy="6858000"/>
+          </a:xfrm>
+          <a:prstGeom prst="rect">
+            <a:avLst/>
+          </a:prstGeom>
+          <a:solidFill>
+            <a:schemeClr val="bg2">
+              <a:alpha val="92000"/>
+            </a:schemeClr>
+          </a:solidFill>
+          <a:ln>
+            <a:noFill/>
+          </a:ln>
+        </p:spPr>
+        <p:style>
+          <a:lnRef idx="2">
+            <a:schemeClr val="accent1">
+              <a:shade val="50000"/>
+            </a:schemeClr>
+          </a:lnRef>
+          <a:fillRef idx="1">
+            <a:schemeClr val="accent1"/>
+          </a:fillRef>
+          <a:effectRef idx="0">
+            <a:schemeClr val="accent1"/>
+          </a:effectRef>
+          <a:fontRef idx="minor">
+            <a:schemeClr val="lt1"/>
+          </a:fontRef>
+        </p:style>
+        <p:txBody>
+          <a:bodyPr rtlCol="0" anchor="ctr"/>
+          <a:lstStyle/>
+          <a:p>
+            <a:pPr algn="ctr"/>
+            <a:endParaRPr lang="en-US"/>
+          </a:p>
+        </p:txBody>
+      </p:sp>
       <p:sp>
         <p:nvSpPr>
           <p:cNvPr id="2" name="Title 1">
@@ -30745,11 +31097,19 @@
             <p:ph type="title"/>
           </p:nvPr>
         </p:nvSpPr>
-        <p:spPr/>
+        <p:spPr>
+          <a:xfrm>
+            <a:off x="1969803" y="808056"/>
+            <a:ext cx="8608037" cy="1077229"/>
+          </a:xfrm>
+        </p:spPr>
         <p:txBody>
-          <a:bodyPr/>
+          <a:bodyPr>
+            <a:normAutofit/>
+          </a:bodyPr>
           <a:lstStyle/>
           <a:p>
+            <a:pPr algn="l"/>
             <a:r>
               <a:rPr lang="en-US" altLang="zh-CN" dirty="0"/>
               <a:t>2.10</a:t>
@@ -30781,11 +31141,347 @@
             <p:ph idx="1"/>
           </p:nvPr>
         </p:nvSpPr>
-        <p:spPr/>
+        <p:spPr>
+          <a:xfrm>
+            <a:off x="1975805" y="2052116"/>
+            <a:ext cx="3135267" cy="3997828"/>
+          </a:xfrm>
+        </p:spPr>
         <p:txBody>
-          <a:bodyPr/>
+          <a:bodyPr>
+            <a:normAutofit/>
+          </a:bodyPr>
           <a:lstStyle/>
           <a:p>
+            <a:r>
+              <a:rPr lang="en-CN" sz="1600" dirty="0"/>
+              <a:t>完成环境配置</a:t>
+            </a:r>
+          </a:p>
+          <a:p>
+            <a:pPr lvl="1"/>
+            <a:r>
+              <a:rPr lang="en-CN" sz="1600" dirty="0"/>
+              <a:t>通过Conda安装了</a:t>
+            </a:r>
+            <a:r>
+              <a:rPr lang="en-US" altLang="zh-CN" sz="1600" dirty="0"/>
+              <a:t>Pytorch</a:t>
+            </a:r>
+          </a:p>
+          <a:p>
+            <a:pPr lvl="1"/>
+            <a:r>
+              <a:rPr lang="en-US" sz="1600" dirty="0"/>
+              <a:t>前辈代码编译无错误</a:t>
+            </a:r>
+          </a:p>
+          <a:p>
+            <a:r>
+              <a:rPr lang="en-US" sz="1400" dirty="0"/>
+              <a:t>问题</a:t>
+            </a:r>
+            <a:r>
+              <a:rPr lang="zh-CN" altLang="en-US" sz="1400" dirty="0"/>
+              <a:t>：</a:t>
+            </a:r>
+            <a:r>
+              <a:rPr lang="en-CN" sz="1400" dirty="0"/>
+              <a:t>我的MacBook</a:t>
+            </a:r>
+            <a:r>
+              <a:rPr lang="zh-CN" altLang="en-US" sz="1400" dirty="0"/>
+              <a:t> </a:t>
+            </a:r>
+            <a:r>
+              <a:rPr lang="en-US" altLang="zh-CN" sz="1400" dirty="0"/>
+              <a:t>Air</a:t>
+            </a:r>
+            <a:r>
+              <a:rPr lang="zh-CN" altLang="en-US" sz="1400" dirty="0"/>
+              <a:t>没有搭载</a:t>
+            </a:r>
+            <a:r>
+              <a:rPr lang="en-US" altLang="zh-CN" sz="1400" dirty="0"/>
+              <a:t>NVIDIA</a:t>
+            </a:r>
+            <a:r>
+              <a:rPr lang="zh-CN" altLang="en-US" sz="1400" dirty="0"/>
+              <a:t>显卡，无法</a:t>
+            </a:r>
+            <a:r>
+              <a:rPr lang="en-US" altLang="zh-CN" sz="1400" dirty="0"/>
+              <a:t>CUDA</a:t>
+            </a:r>
+            <a:r>
+              <a:rPr lang="zh-CN" altLang="en-US" sz="1400" dirty="0"/>
+              <a:t> </a:t>
+            </a:r>
+            <a:r>
+              <a:rPr lang="en-US" altLang="zh-CN" sz="1400" dirty="0"/>
+              <a:t>GPU</a:t>
+            </a:r>
+            <a:r>
+              <a:rPr lang="zh-CN" altLang="en-US" sz="1400" dirty="0"/>
+              <a:t>加速，</a:t>
+            </a:r>
+            <a:r>
+              <a:rPr lang="zh-CN" altLang="en-US" sz="1400" b="1" u="sng" dirty="0">
+                <a:solidFill>
+                  <a:schemeClr val="accent5">
+                    <a:lumMod val="60000"/>
+                    <a:lumOff val="40000"/>
+                  </a:schemeClr>
+                </a:solidFill>
+              </a:rPr>
+              <a:t>因此代码无法运行</a:t>
+            </a:r>
+            <a:endParaRPr lang="en-CN" sz="1400" b="1" u="sng" dirty="0">
+              <a:solidFill>
+                <a:schemeClr val="accent5">
+                  <a:lumMod val="60000"/>
+                  <a:lumOff val="40000"/>
+                </a:schemeClr>
+              </a:solidFill>
+            </a:endParaRPr>
+          </a:p>
+        </p:txBody>
+      </p:sp>
+      <p:pic>
+        <p:nvPicPr>
+          <p:cNvPr id="8" name="Picture 7">
+            <a:extLst>
+              <a:ext uri="{FF2B5EF4-FFF2-40B4-BE49-F238E27FC236}">
+                <a16:creationId xmlns:a16="http://schemas.microsoft.com/office/drawing/2014/main" id="{A0521B46-2883-BC28-9B2B-3B165D885F8F}"/>
+              </a:ext>
+            </a:extLst>
+          </p:cNvPr>
+          <p:cNvPicPr>
+            <a:picLocks noChangeAspect="1"/>
+          </p:cNvPicPr>
+          <p:nvPr/>
+        </p:nvPicPr>
+        <p:blipFill>
+          <a:blip r:embed="rId5"/>
+          <a:stretch>
+            <a:fillRect/>
+          </a:stretch>
+        </p:blipFill>
+        <p:spPr>
+          <a:xfrm>
+            <a:off x="5184152" y="1507324"/>
+            <a:ext cx="4818974" cy="2372033"/>
+          </a:xfrm>
+          <a:prstGeom prst="rect">
+            <a:avLst/>
+          </a:prstGeom>
+          <a:ln>
+            <a:gradFill flip="none" rotWithShape="1">
+              <a:gsLst>
+                <a:gs pos="86000">
+                  <a:schemeClr val="accent6">
+                    <a:lumMod val="67000"/>
+                  </a:schemeClr>
+                </a:gs>
+                <a:gs pos="20000">
+                  <a:schemeClr val="accent6">
+                    <a:lumMod val="97000"/>
+                    <a:lumOff val="3000"/>
+                  </a:schemeClr>
+                </a:gs>
+                <a:gs pos="100000">
+                  <a:schemeClr val="accent6">
+                    <a:lumMod val="60000"/>
+                    <a:lumOff val="40000"/>
+                  </a:schemeClr>
+                </a:gs>
+              </a:gsLst>
+              <a:lin ang="16200000" scaled="1"/>
+              <a:tileRect/>
+            </a:gradFill>
+          </a:ln>
+          <a:effectLst>
+            <a:innerShdw blurRad="127000">
+              <a:prstClr val="black">
+                <a:alpha val="90000"/>
+              </a:prstClr>
+            </a:innerShdw>
+          </a:effectLst>
+        </p:spPr>
+      </p:pic>
+      <p:sp>
+        <p:nvSpPr>
+          <p:cNvPr id="73" name="Rectangle 64">
+            <a:extLst>
+              <a:ext uri="{FF2B5EF4-FFF2-40B4-BE49-F238E27FC236}">
+                <a16:creationId xmlns:a16="http://schemas.microsoft.com/office/drawing/2014/main" id="{D23B4D99-FEA8-489A-8436-A2F113BE1B6E}"/>
+              </a:ext>
+              <a:ext uri="{C183D7F6-B498-43B3-948B-1728B52AA6E4}">
+                <adec:decorative xmlns:adec="http://schemas.microsoft.com/office/drawing/2017/decorative" val="1"/>
+              </a:ext>
+            </a:extLst>
+          </p:cNvPr>
+          <p:cNvSpPr>
+            <a:spLocks noGrp="1" noRot="1" noChangeAspect="1" noMove="1" noResize="1" noEditPoints="1" noAdjustHandles="1" noChangeArrowheads="1" noChangeShapeType="1" noTextEdit="1"/>
+          </p:cNvSpPr>
+          <p:nvPr>
+            <p:extLst>
+              <p:ext uri="{386F3935-93C4-4BCD-93E2-E3B085C9AB24}">
+                <p16:designElem xmlns:p16="http://schemas.microsoft.com/office/powerpoint/2015/main" val="1"/>
+              </p:ext>
+            </p:extLst>
+          </p:nvPr>
+        </p:nvSpPr>
+        <p:spPr>
+          <a:xfrm>
+            <a:off x="11387666" y="-2718"/>
+            <a:ext cx="27432" cy="6858000"/>
+          </a:xfrm>
+          <a:prstGeom prst="rect">
+            <a:avLst/>
+          </a:prstGeom>
+          <a:solidFill>
+            <a:schemeClr val="accent6"/>
+          </a:solidFill>
+          <a:ln>
+            <a:noFill/>
+          </a:ln>
+        </p:spPr>
+        <p:style>
+          <a:lnRef idx="2">
+            <a:schemeClr val="accent1">
+              <a:shade val="50000"/>
+            </a:schemeClr>
+          </a:lnRef>
+          <a:fillRef idx="1">
+            <a:schemeClr val="accent1"/>
+          </a:fillRef>
+          <a:effectRef idx="0">
+            <a:schemeClr val="accent1"/>
+          </a:effectRef>
+          <a:fontRef idx="minor">
+            <a:schemeClr val="lt1"/>
+          </a:fontRef>
+        </p:style>
+        <p:txBody>
+          <a:bodyPr rtlCol="0" anchor="ctr"/>
+          <a:lstStyle/>
+          <a:p>
+            <a:pPr algn="ctr"/>
+            <a:endParaRPr lang="en-US"/>
+          </a:p>
+        </p:txBody>
+      </p:sp>
+      <p:pic>
+        <p:nvPicPr>
+          <p:cNvPr id="9" name="Picture 8">
+            <a:extLst>
+              <a:ext uri="{FF2B5EF4-FFF2-40B4-BE49-F238E27FC236}">
+                <a16:creationId xmlns:a16="http://schemas.microsoft.com/office/drawing/2014/main" id="{044B39A2-5821-D053-D001-DFC920677C1D}"/>
+              </a:ext>
+            </a:extLst>
+          </p:cNvPr>
+          <p:cNvPicPr>
+            <a:picLocks noChangeAspect="1"/>
+          </p:cNvPicPr>
+          <p:nvPr/>
+        </p:nvPicPr>
+        <p:blipFill>
+          <a:blip r:embed="rId6"/>
+          <a:stretch>
+            <a:fillRect/>
+          </a:stretch>
+        </p:blipFill>
+        <p:spPr>
+          <a:xfrm>
+            <a:off x="0" y="5485886"/>
+            <a:ext cx="11860589" cy="981505"/>
+          </a:xfrm>
+          <a:prstGeom prst="rect">
+            <a:avLst/>
+          </a:prstGeom>
+        </p:spPr>
+      </p:pic>
+      <p:sp>
+        <p:nvSpPr>
+          <p:cNvPr id="35" name="TextBox 34">
+            <a:extLst>
+              <a:ext uri="{FF2B5EF4-FFF2-40B4-BE49-F238E27FC236}">
+                <a16:creationId xmlns:a16="http://schemas.microsoft.com/office/drawing/2014/main" id="{2A252F5F-3220-A943-D222-48B9747BFE99}"/>
+              </a:ext>
+            </a:extLst>
+          </p:cNvPr>
+          <p:cNvSpPr txBox="1"/>
+          <p:nvPr/>
+        </p:nvSpPr>
+        <p:spPr>
+          <a:xfrm>
+            <a:off x="5789772" y="4175598"/>
+            <a:ext cx="4008474" cy="1200329"/>
+          </a:xfrm>
+          <a:prstGeom prst="rect">
+            <a:avLst/>
+          </a:prstGeom>
+          <a:noFill/>
+        </p:spPr>
+        <p:txBody>
+          <a:bodyPr wrap="square" rtlCol="0">
+            <a:spAutoFit/>
+          </a:bodyPr>
+          <a:lstStyle/>
+          <a:p>
+            <a:r>
+              <a:rPr lang="en-CN" dirty="0"/>
+              <a:t>可能的解决办法</a:t>
+            </a:r>
+            <a:r>
+              <a:rPr lang="zh-CN" altLang="en-US" dirty="0"/>
+              <a:t>：</a:t>
+            </a:r>
+            <a:endParaRPr lang="en-US" altLang="zh-CN" dirty="0"/>
+          </a:p>
+          <a:p>
+            <a:pPr marL="342900" indent="-342900">
+              <a:buAutoNum type="arabicPeriod"/>
+            </a:pPr>
+            <a:r>
+              <a:rPr lang="zh-CN" altLang="en-US" dirty="0"/>
+              <a:t>计划</a:t>
+            </a:r>
+            <a:r>
+              <a:rPr lang="en-US" altLang="zh-CN" dirty="0"/>
+              <a:t>2.11</a:t>
+            </a:r>
+            <a:r>
+              <a:rPr lang="zh-CN" altLang="en-US" dirty="0"/>
+              <a:t>尝试使用</a:t>
+            </a:r>
+            <a:r>
+              <a:rPr lang="en-US" altLang="zh-CN" dirty="0"/>
+              <a:t>OpenVino</a:t>
+            </a:r>
+          </a:p>
+          <a:p>
+            <a:pPr marL="342900" indent="-342900">
+              <a:buAutoNum type="arabicPeriod"/>
+            </a:pPr>
+            <a:r>
+              <a:rPr lang="en-US" dirty="0"/>
+              <a:t>找一个能用CUDA的电脑</a:t>
+            </a:r>
+          </a:p>
+          <a:p>
+            <a:pPr marL="342900" indent="-342900">
+              <a:buAutoNum type="arabicPeriod"/>
+            </a:pPr>
+            <a:r>
+              <a:rPr lang="en-US" dirty="0"/>
+              <a:t>远程服务器</a:t>
+            </a:r>
+            <a:r>
+              <a:rPr lang="zh-CN" altLang="en-US" dirty="0"/>
+              <a:t>？（不太了解）</a:t>
+            </a:r>
             <a:endParaRPr lang="en-CN" dirty="0"/>
           </a:p>
         </p:txBody>
@@ -30804,6 +31500,116 @@
 </file>
 
 <file path=ppt/slides/slide13.xml><?xml version="1.0" encoding="utf-8"?>
+<p:sld xmlns:a="http://schemas.openxmlformats.org/drawingml/2006/main" xmlns:r="http://schemas.openxmlformats.org/officeDocument/2006/relationships" xmlns:p="http://schemas.openxmlformats.org/presentationml/2006/main">
+  <p:cSld>
+    <p:spTree>
+      <p:nvGrpSpPr>
+        <p:cNvPr id="1" name=""/>
+        <p:cNvGrpSpPr/>
+        <p:nvPr/>
+      </p:nvGrpSpPr>
+      <p:grpSpPr>
+        <a:xfrm>
+          <a:off x="0" y="0"/>
+          <a:ext cx="0" cy="0"/>
+          <a:chOff x="0" y="0"/>
+          <a:chExt cx="0" cy="0"/>
+        </a:xfrm>
+      </p:grpSpPr>
+      <p:sp>
+        <p:nvSpPr>
+          <p:cNvPr id="2" name="Title 1">
+            <a:extLst>
+              <a:ext uri="{FF2B5EF4-FFF2-40B4-BE49-F238E27FC236}">
+                <a16:creationId xmlns:a16="http://schemas.microsoft.com/office/drawing/2014/main" id="{94355788-AE03-1C92-784F-2F16F600D19B}"/>
+              </a:ext>
+            </a:extLst>
+          </p:cNvPr>
+          <p:cNvSpPr>
+            <a:spLocks noGrp="1"/>
+          </p:cNvSpPr>
+          <p:nvPr>
+            <p:ph type="title"/>
+          </p:nvPr>
+        </p:nvSpPr>
+        <p:spPr/>
+        <p:txBody>
+          <a:bodyPr/>
+          <a:lstStyle/>
+          <a:p>
+            <a:endParaRPr lang="en-CN"/>
+          </a:p>
+        </p:txBody>
+      </p:sp>
+      <p:pic>
+        <p:nvPicPr>
+          <p:cNvPr id="7" name="Picture 6">
+            <a:extLst>
+              <a:ext uri="{FF2B5EF4-FFF2-40B4-BE49-F238E27FC236}">
+                <a16:creationId xmlns:a16="http://schemas.microsoft.com/office/drawing/2014/main" id="{66CEBDC0-1E29-86A2-55A5-A0D7C01F2287}"/>
+              </a:ext>
+            </a:extLst>
+          </p:cNvPr>
+          <p:cNvPicPr>
+            <a:picLocks noChangeAspect="1"/>
+          </p:cNvPicPr>
+          <p:nvPr/>
+        </p:nvPicPr>
+        <p:blipFill>
+          <a:blip r:embed="rId2"/>
+          <a:stretch>
+            <a:fillRect/>
+          </a:stretch>
+        </p:blipFill>
+        <p:spPr>
+          <a:xfrm>
+            <a:off x="0" y="2937769"/>
+            <a:ext cx="7772400" cy="626319"/>
+          </a:xfrm>
+          <a:prstGeom prst="rect">
+            <a:avLst/>
+          </a:prstGeom>
+        </p:spPr>
+      </p:pic>
+      <p:sp>
+        <p:nvSpPr>
+          <p:cNvPr id="9" name="Content Placeholder 8">
+            <a:extLst>
+              <a:ext uri="{FF2B5EF4-FFF2-40B4-BE49-F238E27FC236}">
+                <a16:creationId xmlns:a16="http://schemas.microsoft.com/office/drawing/2014/main" id="{68E87F67-D269-7B3A-EEA5-0ED5C8F48E71}"/>
+              </a:ext>
+            </a:extLst>
+          </p:cNvPr>
+          <p:cNvSpPr>
+            <a:spLocks noGrp="1"/>
+          </p:cNvSpPr>
+          <p:nvPr>
+            <p:ph idx="1"/>
+          </p:nvPr>
+        </p:nvSpPr>
+        <p:spPr/>
+        <p:txBody>
+          <a:bodyPr/>
+          <a:lstStyle/>
+          <a:p>
+            <a:endParaRPr lang="en-CN" dirty="0"/>
+          </a:p>
+        </p:txBody>
+      </p:sp>
+    </p:spTree>
+    <p:extLst>
+      <p:ext uri="{BB962C8B-B14F-4D97-AF65-F5344CB8AC3E}">
+        <p14:creationId xmlns:p14="http://schemas.microsoft.com/office/powerpoint/2010/main" val="3201243262"/>
+      </p:ext>
+    </p:extLst>
+  </p:cSld>
+  <p:clrMapOvr>
+    <a:masterClrMapping/>
+  </p:clrMapOvr>
+</p:sld>
+</file>
+
+<file path=ppt/slides/slide14.xml><?xml version="1.0" encoding="utf-8"?>
 <p:sld xmlns:a="http://schemas.openxmlformats.org/drawingml/2006/main" xmlns:r="http://schemas.openxmlformats.org/officeDocument/2006/relationships" xmlns:p="http://schemas.openxmlformats.org/presentationml/2006/main">
   <p:cSld>
     <p:bg>

</xml_diff>